<commit_message>
added high level architecture and component view
</commit_message>
<xml_diff>
--- a/DD/ArchitectureDiagrams/ArchitectureDiagram.pptx
+++ b/DD/ArchitectureDiagrams/ArchitectureDiagram.pptx
@@ -6,6 +6,7 @@
   </p:sldMasterIdLst>
   <p:sldIdLst>
     <p:sldId id="256" r:id="rId2"/>
+    <p:sldId id="257" r:id="rId3"/>
   </p:sldIdLst>
   <p:sldSz cx="12192000" cy="6858000"/>
   <p:notesSz cx="6858000" cy="9144000"/>
@@ -3392,7 +3393,7 @@
         </p:nvGrpSpPr>
         <p:grpSpPr>
           <a:xfrm>
-            <a:off x="492953" y="953103"/>
+            <a:off x="46599" y="2118400"/>
             <a:ext cx="1270693" cy="1023724"/>
             <a:chOff x="873210" y="500448"/>
             <a:chExt cx="1911179" cy="1453638"/>
@@ -3693,10 +3694,10 @@
       </p:grpSp>
       <p:grpSp>
         <p:nvGrpSpPr>
-          <p:cNvPr id="35" name="Gruppo 34">
-            <a:extLst>
-              <a:ext uri="{FF2B5EF4-FFF2-40B4-BE49-F238E27FC236}">
-                <a16:creationId xmlns:a16="http://schemas.microsoft.com/office/drawing/2014/main" id="{6CCF8159-4D92-42CC-B097-D42F468799A8}"/>
+          <p:cNvPr id="37" name="Gruppo 36">
+            <a:extLst>
+              <a:ext uri="{FF2B5EF4-FFF2-40B4-BE49-F238E27FC236}">
+                <a16:creationId xmlns:a16="http://schemas.microsoft.com/office/drawing/2014/main" id="{60873839-494B-4C02-A3D4-A7331FA074AB}"/>
               </a:ext>
             </a:extLst>
           </p:cNvPr>
@@ -3705,110 +3706,7 @@
         </p:nvGrpSpPr>
         <p:grpSpPr>
           <a:xfrm>
-            <a:off x="6495921" y="859484"/>
-            <a:ext cx="1474573" cy="1597966"/>
-            <a:chOff x="3437235" y="1691508"/>
-            <a:chExt cx="1474573" cy="1597966"/>
-          </a:xfrm>
-        </p:grpSpPr>
-        <p:pic>
-          <p:nvPicPr>
-            <p:cNvPr id="12" name="Elemento grafico 11" descr="Computer">
-              <a:extLst>
-                <a:ext uri="{FF2B5EF4-FFF2-40B4-BE49-F238E27FC236}">
-                  <a16:creationId xmlns:a16="http://schemas.microsoft.com/office/drawing/2014/main" id="{7FCF748C-A8BC-42B8-9222-835EC963A9FC}"/>
-                </a:ext>
-              </a:extLst>
-            </p:cNvPr>
-            <p:cNvPicPr>
-              <a:picLocks noChangeAspect="1"/>
-            </p:cNvPicPr>
-            <p:nvPr/>
-          </p:nvPicPr>
-          <p:blipFill>
-            <a:blip r:embed="rId6">
-              <a:extLst>
-                <a:ext uri="{28A0092B-C50C-407E-A947-70E740481C1C}">
-                  <a14:useLocalDpi xmlns:a14="http://schemas.microsoft.com/office/drawing/2010/main" val="0"/>
-                </a:ext>
-                <a:ext uri="{96DAC541-7B7A-43D3-8B79-37D633B846F1}">
-                  <asvg:svgBlip xmlns:asvg="http://schemas.microsoft.com/office/drawing/2016/SVG/main" r:embed="rId7"/>
-                </a:ext>
-              </a:extLst>
-            </a:blip>
-            <a:stretch>
-              <a:fillRect/>
-            </a:stretch>
-          </p:blipFill>
-          <p:spPr>
-            <a:xfrm>
-              <a:off x="3577279" y="1691508"/>
-              <a:ext cx="1210963" cy="1210963"/>
-            </a:xfrm>
-            <a:prstGeom prst="rect">
-              <a:avLst/>
-            </a:prstGeom>
-          </p:spPr>
-        </p:pic>
-        <p:sp>
-          <p:nvSpPr>
-            <p:cNvPr id="34" name="CasellaDiTesto 33">
-              <a:extLst>
-                <a:ext uri="{FF2B5EF4-FFF2-40B4-BE49-F238E27FC236}">
-                  <a16:creationId xmlns:a16="http://schemas.microsoft.com/office/drawing/2014/main" id="{F16073C5-B00C-43D9-9CE3-3F2A7BE509AD}"/>
-                </a:ext>
-              </a:extLst>
-            </p:cNvPr>
-            <p:cNvSpPr txBox="1"/>
-            <p:nvPr/>
-          </p:nvSpPr>
-          <p:spPr>
-            <a:xfrm>
-              <a:off x="3437235" y="2643143"/>
-              <a:ext cx="1474573" cy="646331"/>
-            </a:xfrm>
-            <a:prstGeom prst="rect">
-              <a:avLst/>
-            </a:prstGeom>
-            <a:noFill/>
-          </p:spPr>
-          <p:txBody>
-            <a:bodyPr wrap="square" rtlCol="0">
-              <a:spAutoFit/>
-            </a:bodyPr>
-            <a:lstStyle/>
-            <a:p>
-              <a:pPr algn="ctr"/>
-              <a:r>
-                <a:rPr lang="it-IT" dirty="0"/>
-                <a:t>Server</a:t>
-              </a:r>
-            </a:p>
-            <a:p>
-              <a:pPr algn="ctr"/>
-              <a:r>
-                <a:rPr lang="it-IT" dirty="0"/>
-                <a:t>(Dispatcher)</a:t>
-              </a:r>
-            </a:p>
-          </p:txBody>
-        </p:sp>
-      </p:grpSp>
-      <p:grpSp>
-        <p:nvGrpSpPr>
-          <p:cNvPr id="37" name="Gruppo 36">
-            <a:extLst>
-              <a:ext uri="{FF2B5EF4-FFF2-40B4-BE49-F238E27FC236}">
-                <a16:creationId xmlns:a16="http://schemas.microsoft.com/office/drawing/2014/main" id="{60873839-494B-4C02-A3D4-A7331FA074AB}"/>
-              </a:ext>
-            </a:extLst>
-          </p:cNvPr>
-          <p:cNvGrpSpPr/>
-          <p:nvPr/>
-        </p:nvGrpSpPr>
-        <p:grpSpPr>
-          <a:xfrm>
-            <a:off x="3906790" y="824990"/>
+            <a:off x="5052058" y="631849"/>
             <a:ext cx="1493108" cy="1606037"/>
             <a:chOff x="5303108" y="3251886"/>
             <a:chExt cx="1493108" cy="1606037"/>
@@ -3899,10 +3797,10 @@
       </p:grpSp>
       <p:sp>
         <p:nvSpPr>
-          <p:cNvPr id="38" name="Freccia a destra 37">
-            <a:extLst>
-              <a:ext uri="{FF2B5EF4-FFF2-40B4-BE49-F238E27FC236}">
-                <a16:creationId xmlns:a16="http://schemas.microsoft.com/office/drawing/2014/main" id="{3C65BB6B-27D0-46BE-A6CE-AC370FB0D141}"/>
+          <p:cNvPr id="39" name="Freccia a destra 38">
+            <a:extLst>
+              <a:ext uri="{FF2B5EF4-FFF2-40B4-BE49-F238E27FC236}">
+                <a16:creationId xmlns:a16="http://schemas.microsoft.com/office/drawing/2014/main" id="{A9F19B14-37F3-4914-B4C3-CE3B00F6D6A3}"/>
               </a:ext>
             </a:extLst>
           </p:cNvPr>
@@ -3910,54 +3808,8 @@
           <p:nvPr/>
         </p:nvSpPr>
         <p:spPr>
-          <a:xfrm rot="3279509">
-            <a:off x="4931422" y="2590989"/>
-            <a:ext cx="577856" cy="183857"/>
-          </a:xfrm>
-          <a:prstGeom prst="rightArrow">
-            <a:avLst/>
-          </a:prstGeom>
-        </p:spPr>
-        <p:style>
-          <a:lnRef idx="2">
-            <a:schemeClr val="accent1">
-              <a:shade val="50000"/>
-            </a:schemeClr>
-          </a:lnRef>
-          <a:fillRef idx="1">
-            <a:schemeClr val="accent1"/>
-          </a:fillRef>
-          <a:effectRef idx="0">
-            <a:schemeClr val="accent1"/>
-          </a:effectRef>
-          <a:fontRef idx="minor">
-            <a:schemeClr val="lt1"/>
-          </a:fontRef>
-        </p:style>
-        <p:txBody>
-          <a:bodyPr rtlCol="0" anchor="ctr"/>
-          <a:lstStyle/>
-          <a:p>
-            <a:pPr algn="ctr"/>
-            <a:endParaRPr lang="it-IT"/>
-          </a:p>
-        </p:txBody>
-      </p:sp>
-      <p:sp>
-        <p:nvSpPr>
-          <p:cNvPr id="39" name="Freccia a destra 38">
-            <a:extLst>
-              <a:ext uri="{FF2B5EF4-FFF2-40B4-BE49-F238E27FC236}">
-                <a16:creationId xmlns:a16="http://schemas.microsoft.com/office/drawing/2014/main" id="{A9F19B14-37F3-4914-B4C3-CE3B00F6D6A3}"/>
-              </a:ext>
-            </a:extLst>
-          </p:cNvPr>
-          <p:cNvSpPr/>
-          <p:nvPr/>
-        </p:nvSpPr>
-        <p:spPr>
-          <a:xfrm rot="18857000">
-            <a:off x="6213123" y="2680477"/>
+          <a:xfrm rot="16200000">
+            <a:off x="5609653" y="2508256"/>
             <a:ext cx="609081" cy="180705"/>
           </a:xfrm>
           <a:prstGeom prst="rightArrow">
@@ -4002,8 +3854,8 @@
           <p:nvPr/>
         </p:nvSpPr>
         <p:spPr>
-          <a:xfrm rot="8149162">
-            <a:off x="6008486" y="2545497"/>
+          <a:xfrm rot="5400000">
+            <a:off x="5318718" y="2495310"/>
             <a:ext cx="609081" cy="180705"/>
           </a:xfrm>
           <a:prstGeom prst="rightArrow">
@@ -4049,10 +3901,10 @@
         </p:nvGrpSpPr>
         <p:grpSpPr>
           <a:xfrm>
-            <a:off x="1141568" y="2485467"/>
-            <a:ext cx="1221530" cy="1028498"/>
+            <a:off x="1881131" y="2686507"/>
+            <a:ext cx="1221530" cy="848196"/>
             <a:chOff x="873210" y="500448"/>
-            <a:chExt cx="1911179" cy="1453638"/>
+            <a:chExt cx="1911179" cy="1198806"/>
           </a:xfrm>
         </p:grpSpPr>
         <p:pic>
@@ -4109,7 +3961,7 @@
           <p:spPr>
             <a:xfrm>
               <a:off x="873210" y="1307755"/>
-              <a:ext cx="1911179" cy="646331"/>
+              <a:ext cx="1911179" cy="391499"/>
             </a:xfrm>
             <a:prstGeom prst="rect">
               <a:avLst/>
@@ -4125,19 +3977,8 @@
               <a:pPr algn="ctr"/>
               <a:r>
                 <a:rPr lang="it-IT" sz="1200" dirty="0"/>
-                <a:t>User Client </a:t>
+                <a:t>Organizer</a:t>
               </a:r>
-              <a:br>
-                <a:rPr lang="it-IT" sz="1200" dirty="0"/>
-              </a:br>
-              <a:r>
-                <a:rPr lang="it-IT" sz="1200" dirty="0"/>
-                <a:t>(Data Producer)</a:t>
-              </a:r>
-              <a:br>
-                <a:rPr lang="it-IT" sz="1200" dirty="0"/>
-              </a:br>
-              <a:endParaRPr lang="it-IT" sz="1200" dirty="0"/>
             </a:p>
           </p:txBody>
         </p:sp>
@@ -4239,10 +4080,10 @@
       </p:grpSp>
       <p:sp>
         <p:nvSpPr>
-          <p:cNvPr id="47" name="Freccia a destra 46">
-            <a:extLst>
-              <a:ext uri="{FF2B5EF4-FFF2-40B4-BE49-F238E27FC236}">
-                <a16:creationId xmlns:a16="http://schemas.microsoft.com/office/drawing/2014/main" id="{A2C7BE77-BED4-4237-816C-B1C64A8DF69D}"/>
+          <p:cNvPr id="48" name="Freccia a destra 47">
+            <a:extLst>
+              <a:ext uri="{FF2B5EF4-FFF2-40B4-BE49-F238E27FC236}">
+                <a16:creationId xmlns:a16="http://schemas.microsoft.com/office/drawing/2014/main" id="{F52DBD76-5129-40A2-B112-362EFCF5711C}"/>
               </a:ext>
             </a:extLst>
           </p:cNvPr>
@@ -4250,9 +4091,9 @@
           <p:nvPr/>
         </p:nvSpPr>
         <p:spPr>
-          <a:xfrm>
-            <a:off x="5438531" y="1374970"/>
-            <a:ext cx="983224" cy="179990"/>
+          <a:xfrm rot="20317741">
+            <a:off x="881257" y="1847731"/>
+            <a:ext cx="2443586" cy="151489"/>
           </a:xfrm>
           <a:prstGeom prst="rightArrow">
             <a:avLst/>
@@ -4285,10 +4126,10 @@
       </p:sp>
       <p:sp>
         <p:nvSpPr>
-          <p:cNvPr id="48" name="Freccia a destra 47">
-            <a:extLst>
-              <a:ext uri="{FF2B5EF4-FFF2-40B4-BE49-F238E27FC236}">
-                <a16:creationId xmlns:a16="http://schemas.microsoft.com/office/drawing/2014/main" id="{F52DBD76-5129-40A2-B112-362EFCF5711C}"/>
+          <p:cNvPr id="49" name="Freccia a destra 48">
+            <a:extLst>
+              <a:ext uri="{FF2B5EF4-FFF2-40B4-BE49-F238E27FC236}">
+                <a16:creationId xmlns:a16="http://schemas.microsoft.com/office/drawing/2014/main" id="{250E15CB-F750-4105-A3F9-63359A175509}"/>
               </a:ext>
             </a:extLst>
           </p:cNvPr>
@@ -4296,9 +4137,9 @@
           <p:nvPr/>
         </p:nvSpPr>
         <p:spPr>
-          <a:xfrm>
-            <a:off x="1645026" y="1257472"/>
-            <a:ext cx="2276439" cy="110198"/>
+          <a:xfrm rot="19204009">
+            <a:off x="2672960" y="2566595"/>
+            <a:ext cx="643651" cy="110164"/>
           </a:xfrm>
           <a:prstGeom prst="rightArrow">
             <a:avLst/>
@@ -4331,10 +4172,10 @@
       </p:sp>
       <p:sp>
         <p:nvSpPr>
-          <p:cNvPr id="49" name="Freccia a destra 48">
-            <a:extLst>
-              <a:ext uri="{FF2B5EF4-FFF2-40B4-BE49-F238E27FC236}">
-                <a16:creationId xmlns:a16="http://schemas.microsoft.com/office/drawing/2014/main" id="{250E15CB-F750-4105-A3F9-63359A175509}"/>
+          <p:cNvPr id="50" name="Freccia a destra 49">
+            <a:extLst>
+              <a:ext uri="{FF2B5EF4-FFF2-40B4-BE49-F238E27FC236}">
+                <a16:creationId xmlns:a16="http://schemas.microsoft.com/office/drawing/2014/main" id="{95BCE271-AB70-4772-9724-F9EB6877CFF2}"/>
               </a:ext>
             </a:extLst>
           </p:cNvPr>
@@ -4342,9 +4183,9 @@
           <p:nvPr/>
         </p:nvSpPr>
         <p:spPr>
-          <a:xfrm rot="19806208">
-            <a:off x="2106596" y="2214121"/>
-            <a:ext cx="2076919" cy="113927"/>
+          <a:xfrm rot="9518406">
+            <a:off x="893607" y="2037034"/>
+            <a:ext cx="2422694" cy="126798"/>
           </a:xfrm>
           <a:prstGeom prst="rightArrow">
             <a:avLst/>
@@ -4377,10 +4218,10 @@
       </p:sp>
       <p:sp>
         <p:nvSpPr>
-          <p:cNvPr id="50" name="Freccia a destra 49">
-            <a:extLst>
-              <a:ext uri="{FF2B5EF4-FFF2-40B4-BE49-F238E27FC236}">
-                <a16:creationId xmlns:a16="http://schemas.microsoft.com/office/drawing/2014/main" id="{95BCE271-AB70-4772-9724-F9EB6877CFF2}"/>
+          <p:cNvPr id="51" name="Freccia a destra 50">
+            <a:extLst>
+              <a:ext uri="{FF2B5EF4-FFF2-40B4-BE49-F238E27FC236}">
+                <a16:creationId xmlns:a16="http://schemas.microsoft.com/office/drawing/2014/main" id="{D889F95B-3522-4325-83D8-729B74C25116}"/>
               </a:ext>
             </a:extLst>
           </p:cNvPr>
@@ -4388,9 +4229,9 @@
           <p:nvPr/>
         </p:nvSpPr>
         <p:spPr>
-          <a:xfrm rot="10800000">
-            <a:off x="1623899" y="1421750"/>
-            <a:ext cx="2276439" cy="110198"/>
+          <a:xfrm rot="8385387">
+            <a:off x="2559317" y="2460405"/>
+            <a:ext cx="658489" cy="126635"/>
           </a:xfrm>
           <a:prstGeom prst="rightArrow">
             <a:avLst/>
@@ -4423,10 +4264,10 @@
       </p:sp>
       <p:sp>
         <p:nvSpPr>
-          <p:cNvPr id="51" name="Freccia a destra 50">
-            <a:extLst>
-              <a:ext uri="{FF2B5EF4-FFF2-40B4-BE49-F238E27FC236}">
-                <a16:creationId xmlns:a16="http://schemas.microsoft.com/office/drawing/2014/main" id="{D889F95B-3522-4325-83D8-729B74C25116}"/>
+          <p:cNvPr id="52" name="Freccia a destra 51">
+            <a:extLst>
+              <a:ext uri="{FF2B5EF4-FFF2-40B4-BE49-F238E27FC236}">
+                <a16:creationId xmlns:a16="http://schemas.microsoft.com/office/drawing/2014/main" id="{6DC725FC-9261-4101-B988-9477A1813E62}"/>
               </a:ext>
             </a:extLst>
           </p:cNvPr>
@@ -4434,9 +4275,9 @@
           <p:nvPr/>
         </p:nvSpPr>
         <p:spPr>
-          <a:xfrm rot="9036932">
-            <a:off x="2007464" y="2066330"/>
-            <a:ext cx="2076919" cy="119503"/>
+          <a:xfrm rot="20134814">
+            <a:off x="8430498" y="847023"/>
+            <a:ext cx="692202" cy="176681"/>
           </a:xfrm>
           <a:prstGeom prst="rightArrow">
             <a:avLst/>
@@ -4469,10 +4310,10 @@
       </p:sp>
       <p:sp>
         <p:nvSpPr>
-          <p:cNvPr id="52" name="Freccia a destra 51">
-            <a:extLst>
-              <a:ext uri="{FF2B5EF4-FFF2-40B4-BE49-F238E27FC236}">
-                <a16:creationId xmlns:a16="http://schemas.microsoft.com/office/drawing/2014/main" id="{6DC725FC-9261-4101-B988-9477A1813E62}"/>
+          <p:cNvPr id="53" name="Freccia a destra 52">
+            <a:extLst>
+              <a:ext uri="{FF2B5EF4-FFF2-40B4-BE49-F238E27FC236}">
+                <a16:creationId xmlns:a16="http://schemas.microsoft.com/office/drawing/2014/main" id="{7C069F3D-9804-4C0A-A051-1F98ABAFD884}"/>
               </a:ext>
             </a:extLst>
           </p:cNvPr>
@@ -4480,9 +4321,9 @@
           <p:nvPr/>
         </p:nvSpPr>
         <p:spPr>
-          <a:xfrm rot="20134814">
-            <a:off x="7942237" y="942348"/>
-            <a:ext cx="1151863" cy="186844"/>
+          <a:xfrm rot="9347770">
+            <a:off x="8421561" y="1072129"/>
+            <a:ext cx="717455" cy="166200"/>
           </a:xfrm>
           <a:prstGeom prst="rightArrow">
             <a:avLst/>
@@ -4515,10 +4356,10 @@
       </p:sp>
       <p:sp>
         <p:nvSpPr>
-          <p:cNvPr id="53" name="Freccia a destra 52">
-            <a:extLst>
-              <a:ext uri="{FF2B5EF4-FFF2-40B4-BE49-F238E27FC236}">
-                <a16:creationId xmlns:a16="http://schemas.microsoft.com/office/drawing/2014/main" id="{7C069F3D-9804-4C0A-A051-1F98ABAFD884}"/>
+          <p:cNvPr id="54" name="Freccia a destra 53">
+            <a:extLst>
+              <a:ext uri="{FF2B5EF4-FFF2-40B4-BE49-F238E27FC236}">
+                <a16:creationId xmlns:a16="http://schemas.microsoft.com/office/drawing/2014/main" id="{8FF1096C-A9DF-4916-82A7-7382D6757AA1}"/>
               </a:ext>
             </a:extLst>
           </p:cNvPr>
@@ -4526,9 +4367,9 @@
           <p:nvPr/>
         </p:nvSpPr>
         <p:spPr>
-          <a:xfrm rot="9347770">
-            <a:off x="8001460" y="1140206"/>
-            <a:ext cx="1151863" cy="186844"/>
+          <a:xfrm rot="11340955">
+            <a:off x="8481316" y="1851227"/>
+            <a:ext cx="1964953" cy="192029"/>
           </a:xfrm>
           <a:prstGeom prst="rightArrow">
             <a:avLst/>
@@ -4561,52 +4402,6 @@
       </p:sp>
       <p:sp>
         <p:nvSpPr>
-          <p:cNvPr id="54" name="Freccia a destra 53">
-            <a:extLst>
-              <a:ext uri="{FF2B5EF4-FFF2-40B4-BE49-F238E27FC236}">
-                <a16:creationId xmlns:a16="http://schemas.microsoft.com/office/drawing/2014/main" id="{8FF1096C-A9DF-4916-82A7-7382D6757AA1}"/>
-              </a:ext>
-            </a:extLst>
-          </p:cNvPr>
-          <p:cNvSpPr/>
-          <p:nvPr/>
-        </p:nvSpPr>
-        <p:spPr>
-          <a:xfrm rot="11340955">
-            <a:off x="7917478" y="1801073"/>
-            <a:ext cx="2533722" cy="185392"/>
-          </a:xfrm>
-          <a:prstGeom prst="rightArrow">
-            <a:avLst/>
-          </a:prstGeom>
-        </p:spPr>
-        <p:style>
-          <a:lnRef idx="2">
-            <a:schemeClr val="accent1">
-              <a:shade val="50000"/>
-            </a:schemeClr>
-          </a:lnRef>
-          <a:fillRef idx="1">
-            <a:schemeClr val="accent1"/>
-          </a:fillRef>
-          <a:effectRef idx="0">
-            <a:schemeClr val="accent1"/>
-          </a:effectRef>
-          <a:fontRef idx="minor">
-            <a:schemeClr val="lt1"/>
-          </a:fontRef>
-        </p:style>
-        <p:txBody>
-          <a:bodyPr rtlCol="0" anchor="ctr"/>
-          <a:lstStyle/>
-          <a:p>
-            <a:pPr algn="ctr"/>
-            <a:endParaRPr lang="it-IT"/>
-          </a:p>
-        </p:txBody>
-      </p:sp>
-      <p:sp>
-        <p:nvSpPr>
           <p:cNvPr id="55" name="CasellaDiTesto 54">
             <a:extLst>
               <a:ext uri="{FF2B5EF4-FFF2-40B4-BE49-F238E27FC236}">
@@ -4655,8 +4450,8 @@
         </p:nvSpPr>
         <p:spPr>
           <a:xfrm rot="539955">
-            <a:off x="7919063" y="1999204"/>
-            <a:ext cx="2533722" cy="185392"/>
+            <a:off x="8492053" y="2044295"/>
+            <a:ext cx="1955694" cy="204315"/>
           </a:xfrm>
           <a:prstGeom prst="rightArrow">
             <a:avLst/>
@@ -4857,8 +4652,8 @@
         </p:nvSpPr>
         <p:spPr>
           <a:xfrm rot="2115969">
-            <a:off x="7689299" y="2831539"/>
-            <a:ext cx="2613231" cy="188161"/>
+            <a:off x="8250033" y="3007826"/>
+            <a:ext cx="1996464" cy="190105"/>
           </a:xfrm>
           <a:prstGeom prst="rightArrow">
             <a:avLst/>
@@ -5086,9 +4881,9 @@
           <p:nvPr/>
         </p:nvSpPr>
         <p:spPr>
-          <a:xfrm rot="2887946">
-            <a:off x="1688294" y="4541007"/>
-            <a:ext cx="2674108" cy="129135"/>
+          <a:xfrm rot="3168499">
+            <a:off x="2126026" y="4467114"/>
+            <a:ext cx="2306173" cy="112798"/>
           </a:xfrm>
           <a:prstGeom prst="rightArrow">
             <a:avLst/>
@@ -5178,9 +4973,9 @@
           <p:nvPr/>
         </p:nvSpPr>
         <p:spPr>
-          <a:xfrm rot="13680065">
-            <a:off x="1797608" y="4394252"/>
-            <a:ext cx="2564801" cy="131835"/>
+          <a:xfrm rot="13985472">
+            <a:off x="2243915" y="4336314"/>
+            <a:ext cx="2252828" cy="106902"/>
           </a:xfrm>
           <a:prstGeom prst="rightArrow">
             <a:avLst/>
@@ -5207,7 +5002,7 @@
           <a:lstStyle/>
           <a:p>
             <a:pPr algn="ctr"/>
-            <a:endParaRPr lang="it-IT"/>
+            <a:endParaRPr lang="it-IT" u="sng" dirty="0"/>
           </a:p>
         </p:txBody>
       </p:sp>
@@ -5247,10 +5042,132 @@
           </a:p>
         </p:txBody>
       </p:sp>
+      <p:sp>
+        <p:nvSpPr>
+          <p:cNvPr id="59" name="Freccia a destra 58">
+            <a:extLst>
+              <a:ext uri="{FF2B5EF4-FFF2-40B4-BE49-F238E27FC236}">
+                <a16:creationId xmlns:a16="http://schemas.microsoft.com/office/drawing/2014/main" id="{36A450D2-DAD3-4335-9834-28ACB63057D5}"/>
+              </a:ext>
+            </a:extLst>
+          </p:cNvPr>
+          <p:cNvSpPr/>
+          <p:nvPr/>
+        </p:nvSpPr>
+        <p:spPr>
+          <a:xfrm rot="2692020" flipV="1">
+            <a:off x="676073" y="4365832"/>
+            <a:ext cx="3663507" cy="104194"/>
+          </a:xfrm>
+          <a:prstGeom prst="rightArrow">
+            <a:avLst/>
+          </a:prstGeom>
+        </p:spPr>
+        <p:style>
+          <a:lnRef idx="2">
+            <a:schemeClr val="accent1">
+              <a:shade val="50000"/>
+            </a:schemeClr>
+          </a:lnRef>
+          <a:fillRef idx="1">
+            <a:schemeClr val="accent1"/>
+          </a:fillRef>
+          <a:effectRef idx="0">
+            <a:schemeClr val="accent1"/>
+          </a:effectRef>
+          <a:fontRef idx="minor">
+            <a:schemeClr val="lt1"/>
+          </a:fontRef>
+        </p:style>
+        <p:txBody>
+          <a:bodyPr rtlCol="0" anchor="ctr"/>
+          <a:lstStyle/>
+          <a:p>
+            <a:pPr algn="ctr"/>
+            <a:endParaRPr lang="it-IT"/>
+          </a:p>
+        </p:txBody>
+      </p:sp>
+      <p:sp>
+        <p:nvSpPr>
+          <p:cNvPr id="64" name="Freccia a destra 63">
+            <a:extLst>
+              <a:ext uri="{FF2B5EF4-FFF2-40B4-BE49-F238E27FC236}">
+                <a16:creationId xmlns:a16="http://schemas.microsoft.com/office/drawing/2014/main" id="{BC823D48-F681-482E-8223-818A7ECA39E6}"/>
+              </a:ext>
+            </a:extLst>
+          </p:cNvPr>
+          <p:cNvSpPr/>
+          <p:nvPr/>
+        </p:nvSpPr>
+        <p:spPr>
+          <a:xfrm rot="13504899">
+            <a:off x="556766" y="4446411"/>
+            <a:ext cx="3704626" cy="119556"/>
+          </a:xfrm>
+          <a:prstGeom prst="rightArrow">
+            <a:avLst/>
+          </a:prstGeom>
+        </p:spPr>
+        <p:style>
+          <a:lnRef idx="2">
+            <a:schemeClr val="accent1">
+              <a:shade val="50000"/>
+            </a:schemeClr>
+          </a:lnRef>
+          <a:fillRef idx="1">
+            <a:schemeClr val="accent1"/>
+          </a:fillRef>
+          <a:effectRef idx="0">
+            <a:schemeClr val="accent1"/>
+          </a:effectRef>
+          <a:fontRef idx="minor">
+            <a:schemeClr val="lt1"/>
+          </a:fontRef>
+        </p:style>
+        <p:txBody>
+          <a:bodyPr rtlCol="0" anchor="ctr"/>
+          <a:lstStyle/>
+          <a:p>
+            <a:pPr algn="ctr"/>
+            <a:endParaRPr lang="it-IT"/>
+          </a:p>
+        </p:txBody>
+      </p:sp>
     </p:spTree>
     <p:extLst>
       <p:ext uri="{BB962C8B-B14F-4D97-AF65-F5344CB8AC3E}">
         <p14:creationId xmlns:p14="http://schemas.microsoft.com/office/powerpoint/2010/main" val="1258974340"/>
+      </p:ext>
+    </p:extLst>
+  </p:cSld>
+  <p:clrMapOvr>
+    <a:masterClrMapping/>
+  </p:clrMapOvr>
+</p:sld>
+</file>
+
+<file path=ppt/slides/slide2.xml><?xml version="1.0" encoding="utf-8"?>
+<p:sld xmlns:a="http://schemas.openxmlformats.org/drawingml/2006/main" xmlns:r="http://schemas.openxmlformats.org/officeDocument/2006/relationships" xmlns:p="http://schemas.openxmlformats.org/presentationml/2006/main">
+  <p:cSld>
+    <p:spTree>
+      <p:nvGrpSpPr>
+        <p:cNvPr id="1" name=""/>
+        <p:cNvGrpSpPr/>
+        <p:nvPr/>
+      </p:nvGrpSpPr>
+      <p:grpSpPr>
+        <a:xfrm>
+          <a:off x="0" y="0"/>
+          <a:ext cx="0" cy="0"/>
+          <a:chOff x="0" y="0"/>
+          <a:chExt cx="0" cy="0"/>
+        </a:xfrm>
+      </p:grpSpPr>
+    </p:spTree>
+    <p:extLst>
+      <p:ext uri="{BB962C8B-B14F-4D97-AF65-F5344CB8AC3E}">
+        <p14:creationId xmlns:p14="http://schemas.microsoft.com/office/powerpoint/2010/main" val="1971737632"/>
       </p:ext>
     </p:extLst>
   </p:cSld>

</xml_diff>